<commit_message>
updated last slide of the presentation
</commit_message>
<xml_diff>
--- a/Locality Sensitive Hashing.pptx
+++ b/Locality Sensitive Hashing.pptx
@@ -12,6 +12,7 @@
     <p:sldId id="260" r:id="rId6"/>
     <p:sldId id="261" r:id="rId7"/>
     <p:sldId id="263" r:id="rId8"/>
+    <p:sldId id="264" r:id="rId9"/>
   </p:sldIdLst>
   <p:sldSz cx="12192000" cy="6858000"/>
   <p:notesSz cx="6858000" cy="9144000"/>
@@ -110,6 +111,11 @@
       </a:defRPr>
     </a:lvl9pPr>
   </p:defaultTextStyle>
+  <p:extLst>
+    <p:ext uri="{EFAFB233-063F-42B5-8137-9DF3F51BA10A}">
+      <p15:sldGuideLst xmlns:p15="http://schemas.microsoft.com/office/powerpoint/2012/main"/>
+    </p:ext>
+  </p:extLst>
 </p:presentation>
 </file>
 
@@ -7671,6 +7677,160 @@
 </p:sld>
 </file>
 
+<file path=ppt/slides/slide8.xml><?xml version="1.0" encoding="utf-8"?>
+<p:sld xmlns:a="http://schemas.openxmlformats.org/drawingml/2006/main" xmlns:r="http://schemas.openxmlformats.org/officeDocument/2006/relationships" xmlns:p="http://schemas.openxmlformats.org/presentationml/2006/main">
+  <p:cSld>
+    <p:spTree>
+      <p:nvGrpSpPr>
+        <p:cNvPr id="1" name=""/>
+        <p:cNvGrpSpPr/>
+        <p:nvPr/>
+      </p:nvGrpSpPr>
+      <p:grpSpPr>
+        <a:xfrm>
+          <a:off x="0" y="0"/>
+          <a:ext cx="0" cy="0"/>
+          <a:chOff x="0" y="0"/>
+          <a:chExt cx="0" cy="0"/>
+        </a:xfrm>
+      </p:grpSpPr>
+      <p:sp>
+        <p:nvSpPr>
+          <p:cNvPr id="2" name="Cím 1">
+            <a:extLst>
+              <a:ext uri="{FF2B5EF4-FFF2-40B4-BE49-F238E27FC236}">
+                <a16:creationId xmlns:a16="http://schemas.microsoft.com/office/drawing/2014/main" id="{747E9A39-6638-C8C1-4991-8CA996F80384}"/>
+              </a:ext>
+            </a:extLst>
+          </p:cNvPr>
+          <p:cNvSpPr>
+            <a:spLocks noGrp="1"/>
+          </p:cNvSpPr>
+          <p:nvPr>
+            <p:ph type="title"/>
+          </p:nvPr>
+        </p:nvSpPr>
+        <p:spPr/>
+        <p:txBody>
+          <a:bodyPr/>
+          <a:lstStyle/>
+          <a:p>
+            <a:r>
+              <a:rPr lang="hu-HU" dirty="0" err="1"/>
+              <a:t>Thank</a:t>
+            </a:r>
+            <a:r>
+              <a:rPr lang="hu-HU" dirty="0"/>
+              <a:t> </a:t>
+            </a:r>
+            <a:r>
+              <a:rPr lang="hu-HU" dirty="0" err="1"/>
+              <a:t>you</a:t>
+            </a:r>
+            <a:r>
+              <a:rPr lang="hu-HU" dirty="0"/>
+              <a:t> </a:t>
+            </a:r>
+            <a:r>
+              <a:rPr lang="hu-HU" dirty="0" err="1"/>
+              <a:t>for</a:t>
+            </a:r>
+            <a:r>
+              <a:rPr lang="hu-HU" dirty="0"/>
+              <a:t> </a:t>
+            </a:r>
+            <a:r>
+              <a:rPr lang="hu-HU" dirty="0" err="1"/>
+              <a:t>your</a:t>
+            </a:r>
+            <a:r>
+              <a:rPr lang="hu-HU" dirty="0"/>
+              <a:t> </a:t>
+            </a:r>
+            <a:r>
+              <a:rPr lang="hu-HU" dirty="0" err="1"/>
+              <a:t>attention</a:t>
+            </a:r>
+            <a:endParaRPr lang="hu-HU" dirty="0"/>
+          </a:p>
+        </p:txBody>
+      </p:sp>
+      <p:sp>
+        <p:nvSpPr>
+          <p:cNvPr id="3" name="Tartalom helye 2">
+            <a:extLst>
+              <a:ext uri="{FF2B5EF4-FFF2-40B4-BE49-F238E27FC236}">
+                <a16:creationId xmlns:a16="http://schemas.microsoft.com/office/drawing/2014/main" id="{BF8D3206-33DA-DC86-5798-4A5DDAE43F0B}"/>
+              </a:ext>
+            </a:extLst>
+          </p:cNvPr>
+          <p:cNvSpPr>
+            <a:spLocks noGrp="1"/>
+          </p:cNvSpPr>
+          <p:nvPr>
+            <p:ph idx="1"/>
+          </p:nvPr>
+        </p:nvSpPr>
+        <p:spPr/>
+        <p:txBody>
+          <a:bodyPr/>
+          <a:lstStyle/>
+          <a:p>
+            <a:r>
+              <a:rPr lang="hu-HU" dirty="0"/>
+              <a:t>https://github.com/timarbende/DataScienceHW.git</a:t>
+            </a:r>
+          </a:p>
+          <a:p>
+            <a:r>
+              <a:rPr lang="hu-HU" dirty="0" err="1"/>
+              <a:t>Jeffrey</a:t>
+            </a:r>
+            <a:r>
+              <a:rPr lang="hu-HU" dirty="0"/>
+              <a:t> D. </a:t>
+            </a:r>
+            <a:r>
+              <a:rPr lang="hu-HU" dirty="0" err="1"/>
+              <a:t>Ullman</a:t>
+            </a:r>
+            <a:r>
+              <a:rPr lang="hu-HU" dirty="0"/>
+              <a:t> – Mining of </a:t>
+            </a:r>
+            <a:r>
+              <a:rPr lang="hu-HU" dirty="0" err="1"/>
+              <a:t>Massive</a:t>
+            </a:r>
+            <a:r>
+              <a:rPr lang="hu-HU" dirty="0"/>
+              <a:t> </a:t>
+            </a:r>
+            <a:r>
+              <a:rPr lang="hu-HU" dirty="0" err="1"/>
+              <a:t>Datasets</a:t>
+            </a:r>
+            <a:r>
+              <a:rPr lang="hu-HU"/>
+              <a:t>, 2014</a:t>
+            </a:r>
+            <a:endParaRPr lang="hu-HU" dirty="0"/>
+          </a:p>
+        </p:txBody>
+      </p:sp>
+    </p:spTree>
+    <p:extLst>
+      <p:ext uri="{BB962C8B-B14F-4D97-AF65-F5344CB8AC3E}">
+        <p14:creationId xmlns:p14="http://schemas.microsoft.com/office/powerpoint/2010/main" val="537073071"/>
+      </p:ext>
+    </p:extLst>
+  </p:cSld>
+  <p:clrMapOvr>
+    <a:masterClrMapping/>
+  </p:clrMapOvr>
+</p:sld>
+</file>
+
 <file path=ppt/theme/theme1.xml><?xml version="1.0" encoding="utf-8"?>
 <a:theme xmlns:a="http://schemas.openxmlformats.org/drawingml/2006/main" name="Keret">
   <a:themeElements>

</xml_diff>

<commit_message>
implemented the correct way to use LSH (not to calculate similarities but to generate candidate pairs). updated slides and script to reflect that
</commit_message>
<xml_diff>
--- a/Locality Sensitive Hashing.pptx
+++ b/Locality Sensitive Hashing.pptx
@@ -344,7 +344,7 @@
             <a:fld id="{5586B75A-687E-405C-8A0B-8D00578BA2C3}" type="datetimeFigureOut">
               <a:rPr lang="en-US" dirty="0"/>
               <a:pPr/>
-              <a:t>7/10/2022</a:t>
+              <a:t>7/11/2022</a:t>
             </a:fld>
             <a:endParaRPr lang="en-US" dirty="0"/>
           </a:p>
@@ -511,7 +511,7 @@
             <a:fld id="{5586B75A-687E-405C-8A0B-8D00578BA2C3}" type="datetimeFigureOut">
               <a:rPr lang="en-US" dirty="0"/>
               <a:pPr/>
-              <a:t>7/10/2022</a:t>
+              <a:t>7/11/2022</a:t>
             </a:fld>
             <a:endParaRPr lang="en-US" dirty="0"/>
           </a:p>
@@ -688,7 +688,7 @@
             <a:fld id="{5586B75A-687E-405C-8A0B-8D00578BA2C3}" type="datetimeFigureOut">
               <a:rPr lang="en-US" dirty="0"/>
               <a:pPr/>
-              <a:t>7/10/2022</a:t>
+              <a:t>7/11/2022</a:t>
             </a:fld>
             <a:endParaRPr lang="en-US" dirty="0"/>
           </a:p>
@@ -855,7 +855,7 @@
             <a:fld id="{5586B75A-687E-405C-8A0B-8D00578BA2C3}" type="datetimeFigureOut">
               <a:rPr lang="en-US" dirty="0"/>
               <a:pPr/>
-              <a:t>7/10/2022</a:t>
+              <a:t>7/11/2022</a:t>
             </a:fld>
             <a:endParaRPr lang="en-US" dirty="0"/>
           </a:p>
@@ -1110,7 +1110,7 @@
             <a:fld id="{5586B75A-687E-405C-8A0B-8D00578BA2C3}" type="datetimeFigureOut">
               <a:rPr lang="en-US" dirty="0"/>
               <a:pPr/>
-              <a:t>7/10/2022</a:t>
+              <a:t>7/11/2022</a:t>
             </a:fld>
             <a:endParaRPr lang="en-US" dirty="0"/>
           </a:p>
@@ -1395,7 +1395,7 @@
             <a:fld id="{5586B75A-687E-405C-8A0B-8D00578BA2C3}" type="datetimeFigureOut">
               <a:rPr lang="en-US" dirty="0"/>
               <a:pPr/>
-              <a:t>7/10/2022</a:t>
+              <a:t>7/11/2022</a:t>
             </a:fld>
             <a:endParaRPr lang="en-US" dirty="0"/>
           </a:p>
@@ -1834,7 +1834,7 @@
             <a:fld id="{5586B75A-687E-405C-8A0B-8D00578BA2C3}" type="datetimeFigureOut">
               <a:rPr lang="en-US" dirty="0"/>
               <a:pPr/>
-              <a:t>7/10/2022</a:t>
+              <a:t>7/11/2022</a:t>
             </a:fld>
             <a:endParaRPr lang="en-US" dirty="0"/>
           </a:p>
@@ -1949,7 +1949,7 @@
             <a:fld id="{5586B75A-687E-405C-8A0B-8D00578BA2C3}" type="datetimeFigureOut">
               <a:rPr lang="en-US" dirty="0"/>
               <a:pPr/>
-              <a:t>7/10/2022</a:t>
+              <a:t>7/11/2022</a:t>
             </a:fld>
             <a:endParaRPr lang="en-US" dirty="0"/>
           </a:p>
@@ -2041,7 +2041,7 @@
             <a:fld id="{5586B75A-687E-405C-8A0B-8D00578BA2C3}" type="datetimeFigureOut">
               <a:rPr lang="en-US" dirty="0"/>
               <a:pPr/>
-              <a:t>7/10/2022</a:t>
+              <a:t>7/11/2022</a:t>
             </a:fld>
             <a:endParaRPr lang="en-US" dirty="0"/>
           </a:p>
@@ -2326,7 +2326,7 @@
             <a:fld id="{5586B75A-687E-405C-8A0B-8D00578BA2C3}" type="datetimeFigureOut">
               <a:rPr lang="en-US" dirty="0"/>
               <a:pPr/>
-              <a:t>7/10/2022</a:t>
+              <a:t>7/11/2022</a:t>
             </a:fld>
             <a:endParaRPr lang="en-US" dirty="0"/>
           </a:p>
@@ -2596,7 +2596,7 @@
             <a:fld id="{5586B75A-687E-405C-8A0B-8D00578BA2C3}" type="datetimeFigureOut">
               <a:rPr lang="en-US" dirty="0"/>
               <a:pPr/>
-              <a:t>7/10/2022</a:t>
+              <a:t>7/11/2022</a:t>
             </a:fld>
             <a:endParaRPr lang="en-US" dirty="0"/>
           </a:p>
@@ -2890,7 +2890,7 @@
             <a:fld id="{5586B75A-687E-405C-8A0B-8D00578BA2C3}" type="datetimeFigureOut">
               <a:rPr lang="en-US" dirty="0"/>
               <a:pPr/>
-              <a:t>7/10/2022</a:t>
+              <a:t>7/11/2022</a:t>
             </a:fld>
             <a:endParaRPr lang="en-US" dirty="0"/>
           </a:p>
@@ -4074,7 +4074,7 @@
             </a:r>
             <a:r>
               <a:rPr lang="hu-HU" dirty="0" err="1"/>
-              <a:t>similarty</a:t>
+              <a:t>similarity</a:t>
             </a:r>
             <a:r>
               <a:rPr lang="hu-HU" dirty="0"/>
@@ -7022,10 +7022,10 @@
       </p:grpSpPr>
       <p:pic>
         <p:nvPicPr>
-          <p:cNvPr id="2" name="Kép 1">
+          <p:cNvPr id="5" name="Kép 4">
             <a:extLst>
               <a:ext uri="{FF2B5EF4-FFF2-40B4-BE49-F238E27FC236}">
-                <a16:creationId xmlns:a16="http://schemas.microsoft.com/office/drawing/2014/main" id="{9626310F-FCF0-2BF0-0544-B326D1C53D69}"/>
+                <a16:creationId xmlns:a16="http://schemas.microsoft.com/office/drawing/2014/main" id="{C24B44B2-2F7A-3B29-1532-DBF82F0E4BD6}"/>
               </a:ext>
             </a:extLst>
           </p:cNvPr>
@@ -7036,13 +7036,13 @@
         </p:nvPicPr>
         <p:blipFill rotWithShape="1">
           <a:blip r:embed="rId2"/>
-          <a:srcRect l="12473" t="6377" r="10163" b="13478"/>
+          <a:srcRect b="5139"/>
           <a:stretch/>
         </p:blipFill>
         <p:spPr>
           <a:xfrm>
-            <a:off x="-69574" y="0"/>
-            <a:ext cx="12261573" cy="6858000"/>
+            <a:off x="0" y="0"/>
+            <a:ext cx="12192000" cy="6858000"/>
           </a:xfrm>
           <a:prstGeom prst="rect">
             <a:avLst/>
@@ -7051,10 +7051,10 @@
       </p:pic>
       <p:pic>
         <p:nvPicPr>
-          <p:cNvPr id="4" name="Kép 3">
+          <p:cNvPr id="9" name="Kép 8">
             <a:extLst>
               <a:ext uri="{FF2B5EF4-FFF2-40B4-BE49-F238E27FC236}">
-                <a16:creationId xmlns:a16="http://schemas.microsoft.com/office/drawing/2014/main" id="{21D34426-E73B-3AAC-0C76-7F5C067BD92D}"/>
+                <a16:creationId xmlns:a16="http://schemas.microsoft.com/office/drawing/2014/main" id="{E229B9E0-89F2-8F20-1CC1-23A150750F28}"/>
               </a:ext>
             </a:extLst>
           </p:cNvPr>
@@ -7065,13 +7065,13 @@
         </p:nvPicPr>
         <p:blipFill rotWithShape="1">
           <a:blip r:embed="rId3"/>
-          <a:srcRect l="12636" t="6522" r="10326" b="13768"/>
+          <a:srcRect b="4722"/>
           <a:stretch/>
         </p:blipFill>
         <p:spPr>
           <a:xfrm>
-            <a:off x="-69575" y="0"/>
-            <a:ext cx="12261575" cy="6858000"/>
+            <a:off x="0" y="0"/>
+            <a:ext cx="12192000" cy="6858000"/>
           </a:xfrm>
           <a:prstGeom prst="rect">
             <a:avLst/>
@@ -7080,10 +7080,10 @@
       </p:pic>
       <p:pic>
         <p:nvPicPr>
-          <p:cNvPr id="6" name="Kép 5">
+          <p:cNvPr id="13" name="Kép 12">
             <a:extLst>
               <a:ext uri="{FF2B5EF4-FFF2-40B4-BE49-F238E27FC236}">
-                <a16:creationId xmlns:a16="http://schemas.microsoft.com/office/drawing/2014/main" id="{526ABFBD-BE2F-7D58-991E-5B08CA028B67}"/>
+                <a16:creationId xmlns:a16="http://schemas.microsoft.com/office/drawing/2014/main" id="{54C6FEFE-D380-71A7-FF3E-7940E2667251}"/>
               </a:ext>
             </a:extLst>
           </p:cNvPr>
@@ -7094,13 +7094,13 @@
         </p:nvPicPr>
         <p:blipFill rotWithShape="1">
           <a:blip r:embed="rId4"/>
-          <a:srcRect l="652" r="22392" b="20145"/>
+          <a:srcRect b="4722"/>
           <a:stretch/>
         </p:blipFill>
         <p:spPr>
           <a:xfrm>
-            <a:off x="-69576" y="0"/>
-            <a:ext cx="12261572" cy="6858000"/>
+            <a:off x="0" y="0"/>
+            <a:ext cx="12192000" cy="6858000"/>
           </a:xfrm>
           <a:prstGeom prst="rect">
             <a:avLst/>
@@ -7109,10 +7109,10 @@
       </p:pic>
       <p:pic>
         <p:nvPicPr>
-          <p:cNvPr id="8" name="Kép 7">
+          <p:cNvPr id="15" name="Kép 14">
             <a:extLst>
               <a:ext uri="{FF2B5EF4-FFF2-40B4-BE49-F238E27FC236}">
-                <a16:creationId xmlns:a16="http://schemas.microsoft.com/office/drawing/2014/main" id="{769AFBAC-504C-4538-186A-67762D1C1281}"/>
+                <a16:creationId xmlns:a16="http://schemas.microsoft.com/office/drawing/2014/main" id="{B19C49B4-FDA0-258F-E802-7D7E7678986F}"/>
               </a:ext>
             </a:extLst>
           </p:cNvPr>
@@ -7123,13 +7123,13 @@
         </p:nvPicPr>
         <p:blipFill rotWithShape="1">
           <a:blip r:embed="rId5"/>
-          <a:srcRect l="442" r="22676" b="19565"/>
+          <a:srcRect b="4861"/>
           <a:stretch/>
         </p:blipFill>
         <p:spPr>
           <a:xfrm>
-            <a:off x="-69575" y="0"/>
-            <a:ext cx="12261576" cy="6858000"/>
+            <a:off x="0" y="0"/>
+            <a:ext cx="12192000" cy="6858000"/>
           </a:xfrm>
           <a:prstGeom prst="rect">
             <a:avLst/>
@@ -7138,10 +7138,10 @@
       </p:pic>
       <p:pic>
         <p:nvPicPr>
-          <p:cNvPr id="10" name="Kép 9">
+          <p:cNvPr id="17" name="Kép 16">
             <a:extLst>
               <a:ext uri="{FF2B5EF4-FFF2-40B4-BE49-F238E27FC236}">
-                <a16:creationId xmlns:a16="http://schemas.microsoft.com/office/drawing/2014/main" id="{1EE241B1-0A92-5D4D-C963-E76B6D1BB086}"/>
+                <a16:creationId xmlns:a16="http://schemas.microsoft.com/office/drawing/2014/main" id="{8DAE237C-05CF-C363-79F0-1EE6F667AE5D}"/>
               </a:ext>
             </a:extLst>
           </p:cNvPr>
@@ -7152,42 +7152,13 @@
         </p:nvPicPr>
         <p:blipFill rotWithShape="1">
           <a:blip r:embed="rId6"/>
-          <a:srcRect l="734" r="22310" b="19710"/>
+          <a:srcRect b="5000"/>
           <a:stretch/>
         </p:blipFill>
         <p:spPr>
           <a:xfrm>
-            <a:off x="-69579" y="0"/>
-            <a:ext cx="12261572" cy="6858000"/>
-          </a:xfrm>
-          <a:prstGeom prst="rect">
-            <a:avLst/>
-          </a:prstGeom>
-        </p:spPr>
-      </p:pic>
-      <p:pic>
-        <p:nvPicPr>
-          <p:cNvPr id="12" name="Kép 11">
-            <a:extLst>
-              <a:ext uri="{FF2B5EF4-FFF2-40B4-BE49-F238E27FC236}">
-                <a16:creationId xmlns:a16="http://schemas.microsoft.com/office/drawing/2014/main" id="{3AA25B95-2182-299B-1277-EEA9356764AD}"/>
-              </a:ext>
-            </a:extLst>
-          </p:cNvPr>
-          <p:cNvPicPr>
-            <a:picLocks noChangeAspect="1"/>
-          </p:cNvPicPr>
-          <p:nvPr/>
-        </p:nvPicPr>
-        <p:blipFill rotWithShape="1">
-          <a:blip r:embed="rId7"/>
-          <a:srcRect l="734" r="22228" b="19420"/>
-          <a:stretch/>
-        </p:blipFill>
-        <p:spPr>
-          <a:xfrm>
-            <a:off x="-69582" y="0"/>
-            <a:ext cx="12261582" cy="6858000"/>
+            <a:off x="0" y="0"/>
+            <a:ext cx="12192000" cy="6858000"/>
           </a:xfrm>
           <a:prstGeom prst="rect">
             <a:avLst/>
@@ -7234,7 +7205,7 @@
                                       <p:cBhvr>
                                         <p:cTn id="6" dur="500"/>
                                         <p:tgtEl>
-                                          <p:spTgt spid="2"/>
+                                          <p:spTgt spid="5"/>
                                         </p:tgtEl>
                                       </p:cBhvr>
                                     </p:animEffect>
@@ -7246,7 +7217,7 @@
                                           </p:stCondLst>
                                         </p:cTn>
                                         <p:tgtEl>
-                                          <p:spTgt spid="2"/>
+                                          <p:spTgt spid="5"/>
                                         </p:tgtEl>
                                         <p:attrNameLst>
                                           <p:attrName>style.visibility</p:attrName>
@@ -7273,7 +7244,7 @@
                                           </p:stCondLst>
                                         </p:cTn>
                                         <p:tgtEl>
-                                          <p:spTgt spid="4"/>
+                                          <p:spTgt spid="9"/>
                                         </p:tgtEl>
                                         <p:attrNameLst>
                                           <p:attrName>style.visibility</p:attrName>
@@ -7287,7 +7258,7 @@
                                       <p:cBhvr>
                                         <p:cTn id="10" dur="500"/>
                                         <p:tgtEl>
-                                          <p:spTgt spid="4"/>
+                                          <p:spTgt spid="9"/>
                                         </p:tgtEl>
                                       </p:cBhvr>
                                     </p:animEffect>
@@ -7322,7 +7293,7 @@
                                       <p:cBhvr>
                                         <p:cTn id="14" dur="500"/>
                                         <p:tgtEl>
-                                          <p:spTgt spid="4"/>
+                                          <p:spTgt spid="9"/>
                                         </p:tgtEl>
                                       </p:cBhvr>
                                     </p:animEffect>
@@ -7334,7 +7305,7 @@
                                           </p:stCondLst>
                                         </p:cTn>
                                         <p:tgtEl>
-                                          <p:spTgt spid="4"/>
+                                          <p:spTgt spid="9"/>
                                         </p:tgtEl>
                                         <p:attrNameLst>
                                           <p:attrName>style.visibility</p:attrName>
@@ -7361,7 +7332,7 @@
                                           </p:stCondLst>
                                         </p:cTn>
                                         <p:tgtEl>
-                                          <p:spTgt spid="6"/>
+                                          <p:spTgt spid="13"/>
                                         </p:tgtEl>
                                         <p:attrNameLst>
                                           <p:attrName>style.visibility</p:attrName>
@@ -7375,7 +7346,7 @@
                                       <p:cBhvr>
                                         <p:cTn id="18" dur="500"/>
                                         <p:tgtEl>
-                                          <p:spTgt spid="6"/>
+                                          <p:spTgt spid="13"/>
                                         </p:tgtEl>
                                       </p:cBhvr>
                                     </p:animEffect>
@@ -7410,7 +7381,7 @@
                                       <p:cBhvr>
                                         <p:cTn id="22" dur="500"/>
                                         <p:tgtEl>
-                                          <p:spTgt spid="6"/>
+                                          <p:spTgt spid="13"/>
                                         </p:tgtEl>
                                       </p:cBhvr>
                                     </p:animEffect>
@@ -7422,7 +7393,7 @@
                                           </p:stCondLst>
                                         </p:cTn>
                                         <p:tgtEl>
-                                          <p:spTgt spid="6"/>
+                                          <p:spTgt spid="13"/>
                                         </p:tgtEl>
                                         <p:attrNameLst>
                                           <p:attrName>style.visibility</p:attrName>
@@ -7449,7 +7420,7 @@
                                           </p:stCondLst>
                                         </p:cTn>
                                         <p:tgtEl>
-                                          <p:spTgt spid="8"/>
+                                          <p:spTgt spid="15"/>
                                         </p:tgtEl>
                                         <p:attrNameLst>
                                           <p:attrName>style.visibility</p:attrName>
@@ -7463,7 +7434,7 @@
                                       <p:cBhvr>
                                         <p:cTn id="26" dur="500"/>
                                         <p:tgtEl>
-                                          <p:spTgt spid="8"/>
+                                          <p:spTgt spid="15"/>
                                         </p:tgtEl>
                                       </p:cBhvr>
                                     </p:animEffect>
@@ -7498,7 +7469,7 @@
                                       <p:cBhvr>
                                         <p:cTn id="30" dur="500"/>
                                         <p:tgtEl>
-                                          <p:spTgt spid="8"/>
+                                          <p:spTgt spid="15"/>
                                         </p:tgtEl>
                                       </p:cBhvr>
                                     </p:animEffect>
@@ -7510,7 +7481,7 @@
                                           </p:stCondLst>
                                         </p:cTn>
                                         <p:tgtEl>
-                                          <p:spTgt spid="8"/>
+                                          <p:spTgt spid="15"/>
                                         </p:tgtEl>
                                         <p:attrNameLst>
                                           <p:attrName>style.visibility</p:attrName>
@@ -7537,7 +7508,7 @@
                                           </p:stCondLst>
                                         </p:cTn>
                                         <p:tgtEl>
-                                          <p:spTgt spid="10"/>
+                                          <p:spTgt spid="17"/>
                                         </p:tgtEl>
                                         <p:attrNameLst>
                                           <p:attrName>style.visibility</p:attrName>
@@ -7551,95 +7522,7 @@
                                       <p:cBhvr>
                                         <p:cTn id="34" dur="500"/>
                                         <p:tgtEl>
-                                          <p:spTgt spid="10"/>
-                                        </p:tgtEl>
-                                      </p:cBhvr>
-                                    </p:animEffect>
-                                  </p:childTnLst>
-                                </p:cTn>
-                              </p:par>
-                            </p:childTnLst>
-                          </p:cTn>
-                        </p:par>
-                      </p:childTnLst>
-                    </p:cTn>
-                  </p:par>
-                  <p:par>
-                    <p:cTn id="35" fill="hold">
-                      <p:stCondLst>
-                        <p:cond delay="indefinite"/>
-                      </p:stCondLst>
-                      <p:childTnLst>
-                        <p:par>
-                          <p:cTn id="36" fill="hold">
-                            <p:stCondLst>
-                              <p:cond delay="0"/>
-                            </p:stCondLst>
-                            <p:childTnLst>
-                              <p:par>
-                                <p:cTn id="37" presetID="10" presetClass="exit" presetSubtype="0" fill="hold" nodeType="clickEffect">
-                                  <p:stCondLst>
-                                    <p:cond delay="0"/>
-                                  </p:stCondLst>
-                                  <p:childTnLst>
-                                    <p:animEffect transition="out" filter="fade">
-                                      <p:cBhvr>
-                                        <p:cTn id="38" dur="500"/>
-                                        <p:tgtEl>
-                                          <p:spTgt spid="10"/>
-                                        </p:tgtEl>
-                                      </p:cBhvr>
-                                    </p:animEffect>
-                                    <p:set>
-                                      <p:cBhvr>
-                                        <p:cTn id="39" dur="1" fill="hold">
-                                          <p:stCondLst>
-                                            <p:cond delay="499"/>
-                                          </p:stCondLst>
-                                        </p:cTn>
-                                        <p:tgtEl>
-                                          <p:spTgt spid="10"/>
-                                        </p:tgtEl>
-                                        <p:attrNameLst>
-                                          <p:attrName>style.visibility</p:attrName>
-                                        </p:attrNameLst>
-                                      </p:cBhvr>
-                                      <p:to>
-                                        <p:strVal val="hidden"/>
-                                      </p:to>
-                                    </p:set>
-                                  </p:childTnLst>
-                                </p:cTn>
-                              </p:par>
-                              <p:par>
-                                <p:cTn id="40" presetID="10" presetClass="entr" presetSubtype="0" fill="hold" nodeType="withEffect">
-                                  <p:stCondLst>
-                                    <p:cond delay="0"/>
-                                  </p:stCondLst>
-                                  <p:childTnLst>
-                                    <p:set>
-                                      <p:cBhvr>
-                                        <p:cTn id="41" dur="1" fill="hold">
-                                          <p:stCondLst>
-                                            <p:cond delay="0"/>
-                                          </p:stCondLst>
-                                        </p:cTn>
-                                        <p:tgtEl>
-                                          <p:spTgt spid="12"/>
-                                        </p:tgtEl>
-                                        <p:attrNameLst>
-                                          <p:attrName>style.visibility</p:attrName>
-                                        </p:attrNameLst>
-                                      </p:cBhvr>
-                                      <p:to>
-                                        <p:strVal val="visible"/>
-                                      </p:to>
-                                    </p:set>
-                                    <p:animEffect transition="in" filter="fade">
-                                      <p:cBhvr>
-                                        <p:cTn id="42" dur="500"/>
-                                        <p:tgtEl>
-                                          <p:spTgt spid="12"/>
+                                          <p:spTgt spid="17"/>
                                         </p:tgtEl>
                                       </p:cBhvr>
                                     </p:animEffect>

</xml_diff>